<commit_message>
Dateien gelöscht und Änderungen übernommen
</commit_message>
<xml_diff>
--- a/kap1/docs/pptx/Programmieren lernen mit Java kap.1.pptx
+++ b/kap1/docs/pptx/Programmieren lernen mit Java kap.1.pptx
@@ -122,6 +122,11 @@
       </a:defRPr>
     </a:lvl9pPr>
   </p:defaultTextStyle>
+  <p:extLst>
+    <p:ext uri="{EFAFB233-063F-42B5-8137-9DF3F51BA10A}">
+      <p15:sldGuideLst xmlns:p15="http://schemas.microsoft.com/office/powerpoint/2012/main"/>
+    </p:ext>
+  </p:extLst>
 </p:presentation>
 </file>
 
@@ -15798,7 +15803,7 @@
           <a:p>
             <a:fld id="{2F45B139-7BFD-4DA8-9D98-8BB3D24FEF84}" type="datetimeFigureOut">
               <a:rPr lang="de-DE" smtClean="0"/>
-              <a:t>08.07.2025</a:t>
+              <a:t>16.07.2025</a:t>
             </a:fld>
             <a:endParaRPr lang="de-DE"/>
           </a:p>
@@ -16218,7 +16223,7 @@
           <a:p>
             <a:fld id="{D1D1EADE-8E88-4C7C-8AC5-FB148DE4940E}" type="datetime1">
               <a:rPr lang="en-US" smtClean="0"/>
-              <a:t>7/8/2025</a:t>
+              <a:t>7/16/2025</a:t>
             </a:fld>
             <a:endParaRPr lang="en-US"/>
           </a:p>
@@ -16418,7 +16423,7 @@
           <a:p>
             <a:fld id="{EC3C8B9C-477D-492A-96AD-1FC2CC997A73}" type="datetime1">
               <a:rPr lang="en-US" smtClean="0"/>
-              <a:t>7/8/2025</a:t>
+              <a:t>7/16/2025</a:t>
             </a:fld>
             <a:endParaRPr lang="en-US"/>
           </a:p>
@@ -16628,7 +16633,7 @@
           <a:p>
             <a:fld id="{42D3AED5-E26D-4E29-B1B3-7847B6779594}" type="datetime1">
               <a:rPr lang="en-US" smtClean="0"/>
-              <a:t>7/8/2025</a:t>
+              <a:t>7/16/2025</a:t>
             </a:fld>
             <a:endParaRPr lang="en-US"/>
           </a:p>
@@ -16828,7 +16833,7 @@
           <a:p>
             <a:fld id="{157B6794-849E-4626-908B-D15793550EFB}" type="datetime1">
               <a:rPr lang="en-US" smtClean="0"/>
-              <a:t>7/8/2025</a:t>
+              <a:t>7/16/2025</a:t>
             </a:fld>
             <a:endParaRPr lang="en-US"/>
           </a:p>
@@ -17104,7 +17109,7 @@
           <a:p>
             <a:fld id="{63DB64E7-5594-42A3-ADBF-E95A7ACEAD64}" type="datetime1">
               <a:rPr lang="en-US" smtClean="0"/>
-              <a:t>7/8/2025</a:t>
+              <a:t>7/16/2025</a:t>
             </a:fld>
             <a:endParaRPr lang="en-US"/>
           </a:p>
@@ -17377,7 +17382,7 @@
           <a:p>
             <a:fld id="{18462B0B-D248-4FFB-8695-AD7FA4B1284A}" type="datetime1">
               <a:rPr lang="en-US" smtClean="0"/>
-              <a:t>7/8/2025</a:t>
+              <a:t>7/16/2025</a:t>
             </a:fld>
             <a:endParaRPr lang="en-US"/>
           </a:p>
@@ -17800,7 +17805,7 @@
           <a:p>
             <a:fld id="{D0378EFB-9159-4510-B73F-4F0409ADE937}" type="datetime1">
               <a:rPr lang="en-US" smtClean="0"/>
-              <a:t>7/8/2025</a:t>
+              <a:t>7/16/2025</a:t>
             </a:fld>
             <a:endParaRPr lang="en-US"/>
           </a:p>
@@ -17942,7 +17947,7 @@
           <a:p>
             <a:fld id="{89BC9412-2452-4BED-A324-9D8C115361AD}" type="datetime1">
               <a:rPr lang="en-US" smtClean="0"/>
-              <a:t>7/8/2025</a:t>
+              <a:t>7/16/2025</a:t>
             </a:fld>
             <a:endParaRPr lang="en-US"/>
           </a:p>
@@ -18055,7 +18060,7 @@
           <a:p>
             <a:fld id="{F5318F62-D251-40E8-A23C-F4CFE9FEAB41}" type="datetime1">
               <a:rPr lang="en-US" smtClean="0"/>
-              <a:t>7/8/2025</a:t>
+              <a:t>7/16/2025</a:t>
             </a:fld>
             <a:endParaRPr lang="en-US"/>
           </a:p>
@@ -18368,7 +18373,7 @@
           <a:p>
             <a:fld id="{44F76144-149E-4874-93A5-554A0357CF82}" type="datetime1">
               <a:rPr lang="en-US" smtClean="0"/>
-              <a:t>7/8/2025</a:t>
+              <a:t>7/16/2025</a:t>
             </a:fld>
             <a:endParaRPr lang="en-US"/>
           </a:p>
@@ -18661,7 +18666,7 @@
           <a:p>
             <a:fld id="{50BA65D8-0540-4835-AE5C-25D29DBA01BE}" type="datetime1">
               <a:rPr lang="en-US" smtClean="0"/>
-              <a:t>7/8/2025</a:t>
+              <a:t>7/16/2025</a:t>
             </a:fld>
             <a:endParaRPr lang="en-US"/>
           </a:p>
@@ -18903,7 +18908,7 @@
           <a:p>
             <a:fld id="{E31BA835-12AC-4E8F-955A-EA3F4DE2791F}" type="datetime1">
               <a:rPr lang="en-US" smtClean="0"/>
-              <a:t>7/8/2025</a:t>
+              <a:t>7/16/2025</a:t>
             </a:fld>
             <a:endParaRPr lang="en-US"/>
           </a:p>
@@ -19552,20 +19557,8 @@
           <a:lstStyle/>
           <a:p>
             <a:r>
-              <a:rPr lang="de-DE" dirty="0" err="1"/>
-              <a:t>Created</a:t>
-            </a:r>
-            <a:r>
               <a:rPr lang="de-DE" dirty="0"/>
-              <a:t> </a:t>
-            </a:r>
-            <a:r>
-              <a:rPr lang="de-DE" dirty="0" err="1"/>
-              <a:t>by</a:t>
-            </a:r>
-            <a:r>
-              <a:rPr lang="de-DE" dirty="0"/>
-              <a:t>: Said Cetin</a:t>
+              <a:t>Said Cetin</a:t>
             </a:r>
           </a:p>
         </p:txBody>
@@ -21543,7 +21536,7 @@
           <a:p>
             <a:r>
               <a:rPr lang="de-DE" dirty="0"/>
-              <a:t>Agenda</a:t>
+              <a:t>Kapitel 1 Agenda</a:t>
             </a:r>
           </a:p>
         </p:txBody>

</xml_diff>